<commit_message>
First progress for tagger
</commit_message>
<xml_diff>
--- a/ideas/draft_drawings.pptx
+++ b/ideas/draft_drawings.pptx
@@ -6,6 +6,7 @@
   </p:sldMasterIdLst>
   <p:sldIdLst>
     <p:sldId id="258" r:id="rId2"/>
+    <p:sldId id="259" r:id="rId3"/>
   </p:sldIdLst>
   <p:sldSz cx="18288000" cy="10287000"/>
   <p:notesSz cx="6858000" cy="9144000"/>
@@ -104,6 +105,11 @@
       </a:defRPr>
     </a:lvl9pPr>
   </p:defaultTextStyle>
+  <p:extLst>
+    <p:ext uri="{EFAFB233-063F-42B5-8137-9DF3F51BA10A}">
+      <p15:sldGuideLst xmlns:p15="http://schemas.microsoft.com/office/powerpoint/2012/main"/>
+    </p:ext>
+  </p:extLst>
 </p:presentation>
 </file>
 
@@ -238,7 +244,7 @@
           <a:p>
             <a:fld id="{6DC65CF6-501F-4D12-828D-899904B857EE}" type="datetimeFigureOut">
               <a:rPr lang="en-AU" smtClean="0"/>
-              <a:t>25/07/2023</a:t>
+              <a:t>1/08/2023</a:t>
             </a:fld>
             <a:endParaRPr lang="en-AU"/>
           </a:p>
@@ -408,7 +414,7 @@
           <a:p>
             <a:fld id="{6DC65CF6-501F-4D12-828D-899904B857EE}" type="datetimeFigureOut">
               <a:rPr lang="en-AU" smtClean="0"/>
-              <a:t>25/07/2023</a:t>
+              <a:t>1/08/2023</a:t>
             </a:fld>
             <a:endParaRPr lang="en-AU"/>
           </a:p>
@@ -588,7 +594,7 @@
           <a:p>
             <a:fld id="{6DC65CF6-501F-4D12-828D-899904B857EE}" type="datetimeFigureOut">
               <a:rPr lang="en-AU" smtClean="0"/>
-              <a:t>25/07/2023</a:t>
+              <a:t>1/08/2023</a:t>
             </a:fld>
             <a:endParaRPr lang="en-AU"/>
           </a:p>
@@ -758,7 +764,7 @@
           <a:p>
             <a:fld id="{6DC65CF6-501F-4D12-828D-899904B857EE}" type="datetimeFigureOut">
               <a:rPr lang="en-AU" smtClean="0"/>
-              <a:t>25/07/2023</a:t>
+              <a:t>1/08/2023</a:t>
             </a:fld>
             <a:endParaRPr lang="en-AU"/>
           </a:p>
@@ -1004,7 +1010,7 @@
           <a:p>
             <a:fld id="{6DC65CF6-501F-4D12-828D-899904B857EE}" type="datetimeFigureOut">
               <a:rPr lang="en-AU" smtClean="0"/>
-              <a:t>25/07/2023</a:t>
+              <a:t>1/08/2023</a:t>
             </a:fld>
             <a:endParaRPr lang="en-AU"/>
           </a:p>
@@ -1236,7 +1242,7 @@
           <a:p>
             <a:fld id="{6DC65CF6-501F-4D12-828D-899904B857EE}" type="datetimeFigureOut">
               <a:rPr lang="en-AU" smtClean="0"/>
-              <a:t>25/07/2023</a:t>
+              <a:t>1/08/2023</a:t>
             </a:fld>
             <a:endParaRPr lang="en-AU"/>
           </a:p>
@@ -1603,7 +1609,7 @@
           <a:p>
             <a:fld id="{6DC65CF6-501F-4D12-828D-899904B857EE}" type="datetimeFigureOut">
               <a:rPr lang="en-AU" smtClean="0"/>
-              <a:t>25/07/2023</a:t>
+              <a:t>1/08/2023</a:t>
             </a:fld>
             <a:endParaRPr lang="en-AU"/>
           </a:p>
@@ -1721,7 +1727,7 @@
           <a:p>
             <a:fld id="{6DC65CF6-501F-4D12-828D-899904B857EE}" type="datetimeFigureOut">
               <a:rPr lang="en-AU" smtClean="0"/>
-              <a:t>25/07/2023</a:t>
+              <a:t>1/08/2023</a:t>
             </a:fld>
             <a:endParaRPr lang="en-AU"/>
           </a:p>
@@ -1816,7 +1822,7 @@
           <a:p>
             <a:fld id="{6DC65CF6-501F-4D12-828D-899904B857EE}" type="datetimeFigureOut">
               <a:rPr lang="en-AU" smtClean="0"/>
-              <a:t>25/07/2023</a:t>
+              <a:t>1/08/2023</a:t>
             </a:fld>
             <a:endParaRPr lang="en-AU"/>
           </a:p>
@@ -2093,7 +2099,7 @@
           <a:p>
             <a:fld id="{6DC65CF6-501F-4D12-828D-899904B857EE}" type="datetimeFigureOut">
               <a:rPr lang="en-AU" smtClean="0"/>
-              <a:t>25/07/2023</a:t>
+              <a:t>1/08/2023</a:t>
             </a:fld>
             <a:endParaRPr lang="en-AU"/>
           </a:p>
@@ -2349,7 +2355,7 @@
           <a:p>
             <a:fld id="{6DC65CF6-501F-4D12-828D-899904B857EE}" type="datetimeFigureOut">
               <a:rPr lang="en-AU" smtClean="0"/>
-              <a:t>25/07/2023</a:t>
+              <a:t>1/08/2023</a:t>
             </a:fld>
             <a:endParaRPr lang="en-AU"/>
           </a:p>
@@ -2562,7 +2568,7 @@
           <a:p>
             <a:fld id="{6DC65CF6-501F-4D12-828D-899904B857EE}" type="datetimeFigureOut">
               <a:rPr lang="en-AU" smtClean="0"/>
-              <a:t>25/07/2023</a:t>
+              <a:t>1/08/2023</a:t>
             </a:fld>
             <a:endParaRPr lang="en-AU"/>
           </a:p>
@@ -8786,6 +8792,385 @@
 </p:sld>
 </file>
 
+<file path=ppt/slides/slide2.xml><?xml version="1.0" encoding="utf-8"?>
+<p:sld xmlns:a="http://schemas.openxmlformats.org/drawingml/2006/main" xmlns:r="http://schemas.openxmlformats.org/officeDocument/2006/relationships" xmlns:p="http://schemas.openxmlformats.org/presentationml/2006/main">
+  <p:cSld>
+    <p:spTree>
+      <p:nvGrpSpPr>
+        <p:cNvPr id="1" name=""/>
+        <p:cNvGrpSpPr/>
+        <p:nvPr/>
+      </p:nvGrpSpPr>
+      <p:grpSpPr>
+        <a:xfrm>
+          <a:off x="0" y="0"/>
+          <a:ext cx="0" cy="0"/>
+          <a:chOff x="0" y="0"/>
+          <a:chExt cx="0" cy="0"/>
+        </a:xfrm>
+      </p:grpSpPr>
+      <p:pic>
+        <p:nvPicPr>
+          <p:cNvPr id="3" name="Picture 2">
+            <a:extLst>
+              <a:ext uri="{FF2B5EF4-FFF2-40B4-BE49-F238E27FC236}">
+                <a16:creationId xmlns:a16="http://schemas.microsoft.com/office/drawing/2014/main" id="{91074CEF-DA2E-4E07-84FC-EDC634F96655}"/>
+              </a:ext>
+            </a:extLst>
+          </p:cNvPr>
+          <p:cNvPicPr>
+            <a:picLocks noChangeAspect="1"/>
+          </p:cNvPicPr>
+          <p:nvPr/>
+        </p:nvPicPr>
+        <p:blipFill>
+          <a:blip r:embed="rId2">
+            <a:extLst>
+              <a:ext uri="{28A0092B-C50C-407E-A947-70E740481C1C}">
+                <a14:useLocalDpi xmlns:a14="http://schemas.microsoft.com/office/drawing/2010/main" val="0"/>
+              </a:ext>
+            </a:extLst>
+          </a:blip>
+          <a:stretch>
+            <a:fillRect/>
+          </a:stretch>
+        </p:blipFill>
+        <p:spPr>
+          <a:xfrm>
+            <a:off x="14492" y="0"/>
+            <a:ext cx="18259018" cy="10287000"/>
+          </a:xfrm>
+          <a:prstGeom prst="rect">
+            <a:avLst/>
+          </a:prstGeom>
+        </p:spPr>
+      </p:pic>
+      <p:cxnSp>
+        <p:nvCxnSpPr>
+          <p:cNvPr id="5" name="Straight Arrow Connector 4">
+            <a:extLst>
+              <a:ext uri="{FF2B5EF4-FFF2-40B4-BE49-F238E27FC236}">
+                <a16:creationId xmlns:a16="http://schemas.microsoft.com/office/drawing/2014/main" id="{A9627257-FDBF-41B3-B1D4-D6DD7CF817FE}"/>
+              </a:ext>
+            </a:extLst>
+          </p:cNvPr>
+          <p:cNvCxnSpPr/>
+          <p:nvPr/>
+        </p:nvCxnSpPr>
+        <p:spPr>
+          <a:xfrm>
+            <a:off x="1565753" y="9557351"/>
+            <a:ext cx="1177447" cy="0"/>
+          </a:xfrm>
+          <a:prstGeom prst="straightConnector1">
+            <a:avLst/>
+          </a:prstGeom>
+          <a:ln w="38100">
+            <a:solidFill>
+              <a:schemeClr val="tx1"/>
+            </a:solidFill>
+            <a:headEnd type="triangle"/>
+            <a:tailEnd type="triangle"/>
+          </a:ln>
+        </p:spPr>
+        <p:style>
+          <a:lnRef idx="1">
+            <a:schemeClr val="accent1"/>
+          </a:lnRef>
+          <a:fillRef idx="0">
+            <a:schemeClr val="accent1"/>
+          </a:fillRef>
+          <a:effectRef idx="0">
+            <a:schemeClr val="accent1"/>
+          </a:effectRef>
+          <a:fontRef idx="minor">
+            <a:schemeClr val="tx1"/>
+          </a:fontRef>
+        </p:style>
+      </p:cxnSp>
+      <p:sp>
+        <p:nvSpPr>
+          <p:cNvPr id="6" name="TextBox 5">
+            <a:extLst>
+              <a:ext uri="{FF2B5EF4-FFF2-40B4-BE49-F238E27FC236}">
+                <a16:creationId xmlns:a16="http://schemas.microsoft.com/office/drawing/2014/main" id="{B9F96197-9548-41CE-94E6-048E13B2C471}"/>
+              </a:ext>
+            </a:extLst>
+          </p:cNvPr>
+          <p:cNvSpPr txBox="1"/>
+          <p:nvPr/>
+        </p:nvSpPr>
+        <p:spPr>
+          <a:xfrm>
+            <a:off x="1889819" y="9557351"/>
+            <a:ext cx="529312" cy="430887"/>
+          </a:xfrm>
+          <a:prstGeom prst="rect">
+            <a:avLst/>
+          </a:prstGeom>
+          <a:noFill/>
+        </p:spPr>
+        <p:txBody>
+          <a:bodyPr wrap="none" rtlCol="0">
+            <a:spAutoFit/>
+          </a:bodyPr>
+          <a:lstStyle/>
+          <a:p>
+            <a:pPr algn="ctr"/>
+            <a:r>
+              <a:rPr lang="en-AU" sz="2200" dirty="0"/>
+              <a:t>8%</a:t>
+            </a:r>
+          </a:p>
+        </p:txBody>
+      </p:sp>
+      <p:cxnSp>
+        <p:nvCxnSpPr>
+          <p:cNvPr id="7" name="Straight Arrow Connector 6">
+            <a:extLst>
+              <a:ext uri="{FF2B5EF4-FFF2-40B4-BE49-F238E27FC236}">
+                <a16:creationId xmlns:a16="http://schemas.microsoft.com/office/drawing/2014/main" id="{0DB890D7-736E-4FEB-8DBF-E5E2A52EF3F5}"/>
+              </a:ext>
+            </a:extLst>
+          </p:cNvPr>
+          <p:cNvCxnSpPr>
+            <a:cxnSpLocks/>
+          </p:cNvCxnSpPr>
+          <p:nvPr/>
+        </p:nvCxnSpPr>
+        <p:spPr>
+          <a:xfrm>
+            <a:off x="2832969" y="9557351"/>
+            <a:ext cx="6912280" cy="0"/>
+          </a:xfrm>
+          <a:prstGeom prst="straightConnector1">
+            <a:avLst/>
+          </a:prstGeom>
+          <a:ln w="38100">
+            <a:solidFill>
+              <a:schemeClr val="tx1"/>
+            </a:solidFill>
+            <a:headEnd type="triangle"/>
+            <a:tailEnd type="triangle"/>
+          </a:ln>
+        </p:spPr>
+        <p:style>
+          <a:lnRef idx="1">
+            <a:schemeClr val="accent1"/>
+          </a:lnRef>
+          <a:fillRef idx="0">
+            <a:schemeClr val="accent1"/>
+          </a:fillRef>
+          <a:effectRef idx="0">
+            <a:schemeClr val="accent1"/>
+          </a:effectRef>
+          <a:fontRef idx="minor">
+            <a:schemeClr val="tx1"/>
+          </a:fontRef>
+        </p:style>
+      </p:cxnSp>
+      <p:sp>
+        <p:nvSpPr>
+          <p:cNvPr id="9" name="TextBox 8">
+            <a:extLst>
+              <a:ext uri="{FF2B5EF4-FFF2-40B4-BE49-F238E27FC236}">
+                <a16:creationId xmlns:a16="http://schemas.microsoft.com/office/drawing/2014/main" id="{15F76ED6-4534-487D-AF98-7B0EA05533F6}"/>
+              </a:ext>
+            </a:extLst>
+          </p:cNvPr>
+          <p:cNvSpPr txBox="1"/>
+          <p:nvPr/>
+        </p:nvSpPr>
+        <p:spPr>
+          <a:xfrm>
+            <a:off x="2559584" y="9557350"/>
+            <a:ext cx="529312" cy="430887"/>
+          </a:xfrm>
+          <a:prstGeom prst="rect">
+            <a:avLst/>
+          </a:prstGeom>
+          <a:noFill/>
+        </p:spPr>
+        <p:txBody>
+          <a:bodyPr wrap="none" rtlCol="0">
+            <a:spAutoFit/>
+          </a:bodyPr>
+          <a:lstStyle/>
+          <a:p>
+            <a:pPr algn="ctr"/>
+            <a:r>
+              <a:rPr lang="en-AU" sz="2200" dirty="0"/>
+              <a:t>2%</a:t>
+            </a:r>
+          </a:p>
+        </p:txBody>
+      </p:sp>
+      <p:sp>
+        <p:nvSpPr>
+          <p:cNvPr id="10" name="TextBox 9">
+            <a:extLst>
+              <a:ext uri="{FF2B5EF4-FFF2-40B4-BE49-F238E27FC236}">
+                <a16:creationId xmlns:a16="http://schemas.microsoft.com/office/drawing/2014/main" id="{1D49A431-70B5-43E9-B33F-7F5323E28E3D}"/>
+              </a:ext>
+            </a:extLst>
+          </p:cNvPr>
+          <p:cNvSpPr txBox="1"/>
+          <p:nvPr/>
+        </p:nvSpPr>
+        <p:spPr>
+          <a:xfrm>
+            <a:off x="9570361" y="9557349"/>
+            <a:ext cx="529312" cy="430887"/>
+          </a:xfrm>
+          <a:prstGeom prst="rect">
+            <a:avLst/>
+          </a:prstGeom>
+          <a:noFill/>
+        </p:spPr>
+        <p:txBody>
+          <a:bodyPr wrap="none" rtlCol="0">
+            <a:spAutoFit/>
+          </a:bodyPr>
+          <a:lstStyle/>
+          <a:p>
+            <a:pPr algn="ctr"/>
+            <a:r>
+              <a:rPr lang="en-AU" sz="2200" dirty="0"/>
+              <a:t>4%</a:t>
+            </a:r>
+          </a:p>
+        </p:txBody>
+      </p:sp>
+      <p:cxnSp>
+        <p:nvCxnSpPr>
+          <p:cNvPr id="11" name="Straight Arrow Connector 10">
+            <a:extLst>
+              <a:ext uri="{FF2B5EF4-FFF2-40B4-BE49-F238E27FC236}">
+                <a16:creationId xmlns:a16="http://schemas.microsoft.com/office/drawing/2014/main" id="{C03B3ACC-BAE3-4DB8-81D6-F4D493E55584}"/>
+              </a:ext>
+            </a:extLst>
+          </p:cNvPr>
+          <p:cNvCxnSpPr>
+            <a:cxnSpLocks/>
+          </p:cNvCxnSpPr>
+          <p:nvPr/>
+        </p:nvCxnSpPr>
+        <p:spPr>
+          <a:xfrm>
+            <a:off x="9949841" y="9557349"/>
+            <a:ext cx="6912280" cy="0"/>
+          </a:xfrm>
+          <a:prstGeom prst="straightConnector1">
+            <a:avLst/>
+          </a:prstGeom>
+          <a:ln w="38100">
+            <a:solidFill>
+              <a:schemeClr val="tx1"/>
+            </a:solidFill>
+            <a:headEnd type="triangle"/>
+            <a:tailEnd type="triangle"/>
+          </a:ln>
+        </p:spPr>
+        <p:style>
+          <a:lnRef idx="1">
+            <a:schemeClr val="accent1"/>
+          </a:lnRef>
+          <a:fillRef idx="0">
+            <a:schemeClr val="accent1"/>
+          </a:fillRef>
+          <a:effectRef idx="0">
+            <a:schemeClr val="accent1"/>
+          </a:effectRef>
+          <a:fontRef idx="minor">
+            <a:schemeClr val="tx1"/>
+          </a:fontRef>
+        </p:style>
+      </p:cxnSp>
+      <p:sp>
+        <p:nvSpPr>
+          <p:cNvPr id="12" name="TextBox 11">
+            <a:extLst>
+              <a:ext uri="{FF2B5EF4-FFF2-40B4-BE49-F238E27FC236}">
+                <a16:creationId xmlns:a16="http://schemas.microsoft.com/office/drawing/2014/main" id="{E372EDB0-056C-496C-8175-7FE86E8E14EF}"/>
+              </a:ext>
+            </a:extLst>
+          </p:cNvPr>
+          <p:cNvSpPr txBox="1"/>
+          <p:nvPr/>
+        </p:nvSpPr>
+        <p:spPr>
+          <a:xfrm>
+            <a:off x="5947157" y="9557348"/>
+            <a:ext cx="671980" cy="430887"/>
+          </a:xfrm>
+          <a:prstGeom prst="rect">
+            <a:avLst/>
+          </a:prstGeom>
+          <a:noFill/>
+        </p:spPr>
+        <p:txBody>
+          <a:bodyPr wrap="none" rtlCol="0">
+            <a:spAutoFit/>
+          </a:bodyPr>
+          <a:lstStyle/>
+          <a:p>
+            <a:pPr algn="ctr"/>
+            <a:r>
+              <a:rPr lang="en-AU" sz="2200" dirty="0"/>
+              <a:t>42%</a:t>
+            </a:r>
+          </a:p>
+        </p:txBody>
+      </p:sp>
+      <p:sp>
+        <p:nvSpPr>
+          <p:cNvPr id="13" name="TextBox 12">
+            <a:extLst>
+              <a:ext uri="{FF2B5EF4-FFF2-40B4-BE49-F238E27FC236}">
+                <a16:creationId xmlns:a16="http://schemas.microsoft.com/office/drawing/2014/main" id="{462361C9-DDD2-4829-AD95-FB39F17D79EA}"/>
+              </a:ext>
+            </a:extLst>
+          </p:cNvPr>
+          <p:cNvSpPr txBox="1"/>
+          <p:nvPr/>
+        </p:nvSpPr>
+        <p:spPr>
+          <a:xfrm>
+            <a:off x="13514611" y="9557347"/>
+            <a:ext cx="671980" cy="430887"/>
+          </a:xfrm>
+          <a:prstGeom prst="rect">
+            <a:avLst/>
+          </a:prstGeom>
+          <a:noFill/>
+        </p:spPr>
+        <p:txBody>
+          <a:bodyPr wrap="none" rtlCol="0">
+            <a:spAutoFit/>
+          </a:bodyPr>
+          <a:lstStyle/>
+          <a:p>
+            <a:pPr algn="ctr"/>
+            <a:r>
+              <a:rPr lang="en-AU" sz="2200" dirty="0"/>
+              <a:t>42%</a:t>
+            </a:r>
+          </a:p>
+        </p:txBody>
+      </p:sp>
+    </p:spTree>
+    <p:extLst>
+      <p:ext uri="{BB962C8B-B14F-4D97-AF65-F5344CB8AC3E}">
+        <p14:creationId xmlns:p14="http://schemas.microsoft.com/office/powerpoint/2010/main" val="3301706653"/>
+      </p:ext>
+    </p:extLst>
+  </p:cSld>
+  <p:clrMapOvr>
+    <a:masterClrMapping/>
+  </p:clrMapOvr>
+</p:sld>
+</file>
+
 <file path=ppt/theme/theme1.xml><?xml version="1.0" encoding="utf-8"?>
 <a:theme xmlns:a="http://schemas.openxmlformats.org/drawingml/2006/main" name="Office Theme">
   <a:themeElements>

</xml_diff>